<commit_message>
PUTA QUE PARIU FINALMENTE ESTA MERDA ACABOU FODA-SEEEEEEEEEEEEEEEEEEEEEEEE
</commit_message>
<xml_diff>
--- a/UMLS_AED/PROJ_AED.pptx
+++ b/UMLS_AED/PROJ_AED.pptx
@@ -4045,7 +4045,7 @@
             <a:pPr rtl="0"/>
             <a:fld id="{C8CB2839-1C58-4BCF-A979-9A1F76285043}" type="datetime1">
               <a:rPr lang="pt-PT" smtClean="0"/>
-              <a:t>20/12/2021</a:t>
+              <a:t>21/12/2021</a:t>
             </a:fld>
             <a:endParaRPr lang="en-US" dirty="0"/>
           </a:p>
@@ -4215,7 +4215,7 @@
             <a:pPr rtl="0"/>
             <a:fld id="{DEB0334B-A01B-4ED9-84B2-4047E9C40D52}" type="datetime1">
               <a:rPr lang="pt-PT" smtClean="0"/>
-              <a:t>20/12/2021</a:t>
+              <a:t>21/12/2021</a:t>
             </a:fld>
             <a:endParaRPr lang="en-US"/>
           </a:p>
@@ -4729,7 +4729,7 @@
             <a:pPr rtl="0"/>
             <a:fld id="{133C872B-9021-4EB5-978D-88549561B1BF}" type="datetime1">
               <a:rPr lang="pt-PT" smtClean="0"/>
-              <a:t>20/12/2021</a:t>
+              <a:t>21/12/2021</a:t>
             </a:fld>
             <a:endParaRPr lang="en-US" dirty="0"/>
           </a:p>
@@ -4936,7 +4936,7 @@
             <a:pPr rtl="0"/>
             <a:fld id="{D596A2F7-C4B5-4B27-A004-0671785D38D6}" type="datetime1">
               <a:rPr lang="pt-PT" smtClean="0"/>
-              <a:t>20/12/2021</a:t>
+              <a:t>21/12/2021</a:t>
             </a:fld>
             <a:endParaRPr lang="en-US" dirty="0"/>
           </a:p>
@@ -5302,7 +5302,7 @@
             <a:pPr rtl="0"/>
             <a:fld id="{1F6322EC-603C-467A-ABE0-DDADD4D3F055}" type="datetime1">
               <a:rPr lang="pt-PT" smtClean="0"/>
-              <a:t>20/12/2021</a:t>
+              <a:t>21/12/2021</a:t>
             </a:fld>
             <a:endParaRPr lang="en-US" dirty="0"/>
           </a:p>
@@ -5504,7 +5504,7 @@
             <a:pPr rtl="0"/>
             <a:fld id="{9E09E755-EDBC-4192-AC9E-FCC227FEE010}" type="datetime1">
               <a:rPr lang="pt-PT" smtClean="0"/>
-              <a:t>20/12/2021</a:t>
+              <a:t>21/12/2021</a:t>
             </a:fld>
             <a:endParaRPr lang="en-US" dirty="0"/>
           </a:p>
@@ -5820,7 +5820,7 @@
             <a:pPr rtl="0"/>
             <a:fld id="{5D96CFE7-A573-4719-8192-DEF0EFA75C09}" type="datetime1">
               <a:rPr lang="pt-PT" smtClean="0"/>
-              <a:t>20/12/2021</a:t>
+              <a:t>21/12/2021</a:t>
             </a:fld>
             <a:endParaRPr lang="en-US" dirty="0"/>
           </a:p>
@@ -6077,7 +6077,7 @@
             <a:pPr rtl="0"/>
             <a:fld id="{20897C99-EC67-49CE-86D9-F22CCAECAE5E}" type="datetime1">
               <a:rPr lang="pt-PT" smtClean="0"/>
-              <a:t>20/12/2021</a:t>
+              <a:t>21/12/2021</a:t>
             </a:fld>
             <a:endParaRPr lang="en-US" dirty="0"/>
           </a:p>
@@ -6511,7 +6511,7 @@
             <a:pPr rtl="0"/>
             <a:fld id="{BE14A099-40C0-42BE-A240-B8755EA7A0CD}" type="datetime1">
               <a:rPr lang="pt-PT" smtClean="0"/>
-              <a:t>20/12/2021</a:t>
+              <a:t>21/12/2021</a:t>
             </a:fld>
             <a:endParaRPr lang="en-US" dirty="0"/>
           </a:p>
@@ -6638,7 +6638,7 @@
             <a:pPr rtl="0"/>
             <a:fld id="{51700D0E-9E8B-4A9D-866D-52C1587B5C4A}" type="datetime1">
               <a:rPr lang="pt-PT" smtClean="0"/>
-              <a:t>20/12/2021</a:t>
+              <a:t>21/12/2021</a:t>
             </a:fld>
             <a:endParaRPr lang="en-US" dirty="0"/>
           </a:p>
@@ -6736,7 +6736,7 @@
             <a:pPr rtl="0"/>
             <a:fld id="{FB469DDE-4AA9-46B4-8B4B-ABB43359B0EE}" type="datetime1">
               <a:rPr lang="pt-PT" smtClean="0"/>
-              <a:t>20/12/2021</a:t>
+              <a:t>21/12/2021</a:t>
             </a:fld>
             <a:endParaRPr lang="en-US" dirty="0"/>
           </a:p>
@@ -7117,7 +7117,7 @@
             <a:pPr rtl="0"/>
             <a:fld id="{EBD87A0C-49D4-4622-B87D-BA2C1B765D76}" type="datetime1">
               <a:rPr lang="pt-PT" smtClean="0"/>
-              <a:t>20/12/2021</a:t>
+              <a:t>21/12/2021</a:t>
             </a:fld>
             <a:endParaRPr lang="en-US" dirty="0"/>
           </a:p>
@@ -7415,7 +7415,7 @@
             <a:pPr rtl="0"/>
             <a:fld id="{E99E4EDA-B394-40D1-A4AB-5A278200C327}" type="datetime1">
               <a:rPr lang="pt-PT" smtClean="0"/>
-              <a:t>20/12/2021</a:t>
+              <a:t>21/12/2021</a:t>
             </a:fld>
             <a:endParaRPr lang="en-US" dirty="0"/>
           </a:p>
@@ -7633,7 +7633,7 @@
             <a:pPr rtl="0"/>
             <a:fld id="{0B0569AC-F3A4-423E-A7DC-09E1643F31E7}" type="datetime1">
               <a:rPr lang="pt-PT" smtClean="0"/>
-              <a:t>20/12/2021</a:t>
+              <a:t>21/12/2021</a:t>
             </a:fld>
             <a:endParaRPr lang="en-US" dirty="0"/>
           </a:p>
@@ -8802,7 +8802,7 @@
             </a:r>
             <a:r>
               <a:rPr lang="pt-PT" dirty="0"/>
-              <a:t>” que permite atualizar o ficheiro de texto tendo em conta a informação que está no programa, sendo que esta tem de ser acionada pela companhia e não ocorre automaticamente. Isto leva a uma maior segurança, por exemplo, se, por lapso, eliminar um avião, o ficheiro continua a salvo.</a:t>
+              <a:t>” que permite atualizar o ficheiro de texto, tendo em conta a informação que está no programa, sendo que esta tem de ser acionada pela companhia e não ocorre automaticamente. Isto leva a uma maior segurança se, por exemplo, por lapso, se eliminar um avião. Mesmo assim, o ficheiro continuará guardado sem quaisquer alterações que possam prejudicar a gestão de cada companhia.</a:t>
             </a:r>
           </a:p>
         </p:txBody>
@@ -8831,7 +8831,7 @@
             <a:pPr rtl="0"/>
             <a:fld id="{9E09E755-EDBC-4192-AC9E-FCC227FEE010}" type="datetime1">
               <a:rPr lang="pt-PT" smtClean="0"/>
-              <a:t>20/12/2021</a:t>
+              <a:t>21/12/2021</a:t>
             </a:fld>
             <a:endParaRPr lang="en-US" dirty="0"/>
           </a:p>
@@ -8913,8 +8913,8 @@
         </p:nvSpPr>
         <p:spPr>
           <a:xfrm>
-            <a:off x="461552" y="1611757"/>
-            <a:ext cx="11029615" cy="3634486"/>
+            <a:off x="461552" y="1611756"/>
+            <a:ext cx="11029615" cy="4544087"/>
           </a:xfrm>
         </p:spPr>
         <p:txBody>
@@ -8923,7 +8923,7 @@
           <a:p>
             <a:r>
               <a:rPr lang="pt-PT" dirty="0"/>
-              <a:t>A maior dificuldade foi, provavelmente, gerir a ligação entre as diferentes classes. Foi optado por um sistema de ligação circular entre classes como companhia, aviões, voos, etc. Porém, não foi possível estabelecer certas ligações, tais como, a ligação entre a bagagem e o voo ou a ligação entre o transporte e o aeroporto.</a:t>
+              <a:t>A maior dificuldade foi, provavelmente, gerir a ligação entre as diferentes classes. Optamos por um sistema de ligação circular entre classes como companhia, aviões, voos, etc. Porém, não foi possível estabelecer certas ligações, tais como: a ligação entre a bagagem e o voo ou a ligação entre o transporte e o aeroporto.</a:t>
             </a:r>
           </a:p>
           <a:p>
@@ -8937,7 +8937,29 @@
             </a:r>
             <a:r>
               <a:rPr lang="pt-PT" dirty="0"/>
-              <a:t>” dos diferentes ficheiros de texto, sendo necessário adaptar o código ao computador em que este é corrido.</a:t>
+              <a:t>” </a:t>
+            </a:r>
+            <a:r>
+              <a:rPr lang="pt-PT" u="sng" dirty="0"/>
+              <a:t>dos</a:t>
+            </a:r>
+            <a:r>
+              <a:rPr lang="pt-PT" dirty="0"/>
+              <a:t> diferentes ficheiros de texto, sendo necessário adaptar o código ao computador em que este é corrido.</a:t>
+            </a:r>
+          </a:p>
+          <a:p>
+            <a:r>
+              <a:rPr lang="pt-PT" dirty="0"/>
+              <a:t>Quanto à prestação de cada elemento no grupo, devido ao tempo disponível para a realização e com a condição de sermos apenas uma dupla, vimo-nos decididos a aplicar um enorme esforço no desenvolvimento do projeto. Por vezes, um criava ficheiros de </a:t>
+            </a:r>
+            <a:r>
+              <a:rPr lang="pt-PT" dirty="0" err="1"/>
+              <a:t>raíz</a:t>
+            </a:r>
+            <a:r>
+              <a:rPr lang="pt-PT" dirty="0"/>
+              <a:t> e as suas bases e o outro complementava-as, e outras, acontecia o chamado vice-versa. </a:t>
             </a:r>
           </a:p>
         </p:txBody>
@@ -8966,7 +8988,7 @@
             <a:pPr rtl="0"/>
             <a:fld id="{9E09E755-EDBC-4192-AC9E-FCC227FEE010}" type="datetime1">
               <a:rPr lang="pt-PT" smtClean="0"/>
-              <a:t>20/12/2021</a:t>
+              <a:t>21/12/2021</a:t>
             </a:fld>
             <a:endParaRPr lang="en-US" dirty="0"/>
           </a:p>
@@ -9161,48 +9183,7 @@
           <a:p>
             <a:r>
               <a:rPr lang="pt-PT" dirty="0"/>
-              <a:t>Cada uma das interfaces previamente enunciadas possuem certos métodos associados às diversas classes, sendo completamente distintas entre si.</a:t>
-            </a:r>
-          </a:p>
-          <a:p>
-            <a:r>
-              <a:rPr lang="pt-PT" b="1" dirty="0"/>
-              <a:t>Interface do Cliente: </a:t>
-            </a:r>
-          </a:p>
-          <a:p>
-            <a:pPr lvl="1"/>
-            <a:r>
-              <a:rPr lang="pt-PT" dirty="0"/>
-              <a:t>Compra bilhetes;</a:t>
-            </a:r>
-          </a:p>
-          <a:p>
-            <a:pPr lvl="1"/>
-            <a:r>
-              <a:rPr lang="pt-PT" dirty="0"/>
-              <a:t>Gere a disponibilidade de bilhetes;</a:t>
-            </a:r>
-          </a:p>
-          <a:p>
-            <a:pPr lvl="1"/>
-            <a:r>
-              <a:rPr lang="pt-PT" dirty="0"/>
-              <a:t>Gere a bagagem;</a:t>
-            </a:r>
-          </a:p>
-          <a:p>
-            <a:pPr lvl="1"/>
-            <a:r>
-              <a:rPr lang="pt-PT" dirty="0"/>
-              <a:t>Informa acerca dos transportes perto do aeroporto;</a:t>
-            </a:r>
-          </a:p>
-          <a:p>
-            <a:pPr lvl="1"/>
-            <a:r>
-              <a:rPr lang="pt-PT" dirty="0"/>
-              <a:t>Utiliza operações CRUD.</a:t>
+              <a:t>Cada uma destas interfaces, bastante distintas uma da outra, dividem o problema e a sua solução em dois. Desta maneira, tratam ambas de problemas distintos mas que, após várias relações entre as classes usadas em cada uma delas, acabam por se complementar. Desta forma, possibilitamos uma maior e mais versátil gestão e alteração dos dados do projeto.</a:t>
             </a:r>
           </a:p>
         </p:txBody>
@@ -9231,7 +9212,7 @@
             <a:pPr rtl="0"/>
             <a:fld id="{9E09E755-EDBC-4192-AC9E-FCC227FEE010}" type="datetime1">
               <a:rPr lang="pt-PT" smtClean="0"/>
-              <a:t>20/12/2021</a:t>
+              <a:t>21/12/2021</a:t>
             </a:fld>
             <a:endParaRPr lang="en-US" dirty="0"/>
           </a:p>
@@ -9285,7 +9266,7 @@
         </p:nvSpPr>
         <p:spPr>
           <a:xfrm>
-            <a:off x="581191" y="288290"/>
+            <a:off x="581191" y="68961"/>
             <a:ext cx="11029616" cy="1188720"/>
           </a:xfrm>
         </p:spPr>
@@ -9319,11 +9300,13 @@
         <p:spPr>
           <a:xfrm>
             <a:off x="581191" y="1441396"/>
-            <a:ext cx="11029615" cy="3975207"/>
+            <a:ext cx="11029615" cy="4982518"/>
           </a:xfrm>
         </p:spPr>
         <p:txBody>
-          <a:bodyPr/>
+          <a:bodyPr>
+            <a:normAutofit lnSpcReduction="10000"/>
+          </a:bodyPr>
           <a:lstStyle/>
           <a:p>
             <a:r>
@@ -9372,6 +9355,47 @@
               <a:buNone/>
             </a:pPr>
             <a:endParaRPr lang="pt-PT" sz="1800" dirty="0"/>
+          </a:p>
+          <a:p>
+            <a:r>
+              <a:rPr lang="pt-PT" sz="2000" b="1" dirty="0"/>
+              <a:t>Interface do cliente: </a:t>
+            </a:r>
+          </a:p>
+          <a:p>
+            <a:pPr lvl="1"/>
+            <a:r>
+              <a:rPr lang="pt-PT" sz="1800" dirty="0"/>
+              <a:t>Compra bilhetes;</a:t>
+            </a:r>
+          </a:p>
+          <a:p>
+            <a:pPr lvl="1"/>
+            <a:r>
+              <a:rPr lang="pt-PT" sz="1800" dirty="0"/>
+              <a:t>Gere a disponibilidade de bilhetes;</a:t>
+            </a:r>
+          </a:p>
+          <a:p>
+            <a:pPr lvl="1"/>
+            <a:r>
+              <a:rPr lang="pt-PT" sz="1800" dirty="0"/>
+              <a:t>Gere a bagagem;</a:t>
+            </a:r>
+          </a:p>
+          <a:p>
+            <a:pPr lvl="1"/>
+            <a:r>
+              <a:rPr lang="pt-PT" sz="1800" dirty="0"/>
+              <a:t>Informa acerca dos transportes perto do aeroporto;</a:t>
+            </a:r>
+          </a:p>
+          <a:p>
+            <a:pPr lvl="1"/>
+            <a:r>
+              <a:rPr lang="pt-PT" sz="1800" dirty="0"/>
+              <a:t>Utiliza operações CRUD.</a:t>
+            </a:r>
           </a:p>
           <a:p>
             <a:endParaRPr lang="pt-PT" dirty="0"/>
@@ -9402,7 +9426,7 @@
             <a:pPr rtl="0"/>
             <a:fld id="{9E09E755-EDBC-4192-AC9E-FCC227FEE010}" type="datetime1">
               <a:rPr lang="pt-PT" smtClean="0"/>
-              <a:t>20/12/2021</a:t>
+              <a:t>21/12/2021</a:t>
             </a:fld>
             <a:endParaRPr lang="en-US" dirty="0"/>
           </a:p>
@@ -9530,7 +9554,7 @@
             <a:pPr rtl="0"/>
             <a:fld id="{9E09E755-EDBC-4192-AC9E-FCC227FEE010}" type="datetime1">
               <a:rPr lang="pt-PT" smtClean="0"/>
-              <a:t>20/12/2021</a:t>
+              <a:t>21/12/2021</a:t>
             </a:fld>
             <a:endParaRPr lang="en-US" dirty="0"/>
           </a:p>
@@ -9657,1467 +9681,41 @@
             <a:pPr rtl="0"/>
             <a:fld id="{9E09E755-EDBC-4192-AC9E-FCC227FEE010}" type="datetime1">
               <a:rPr lang="pt-PT" smtClean="0"/>
-              <a:t>20/12/2021</a:t>
+              <a:t>21/12/2021</a:t>
             </a:fld>
             <a:endParaRPr lang="en-US" dirty="0"/>
           </a:p>
         </p:txBody>
       </p:sp>
-      <p:graphicFrame>
-        <p:nvGraphicFramePr>
-          <p:cNvPr id="8" name="Tabela 8">
+      <p:pic>
+        <p:nvPicPr>
+          <p:cNvPr id="7" name="Imagem 6">
             <a:extLst>
               <a:ext uri="{FF2B5EF4-FFF2-40B4-BE49-F238E27FC236}">
-                <a16:creationId xmlns:a16="http://schemas.microsoft.com/office/drawing/2014/main" id="{ACFBD175-18AC-41CA-8EC2-0202B1EE5FF1}"/>
+                <a16:creationId xmlns:a16="http://schemas.microsoft.com/office/drawing/2014/main" id="{F7978D75-8356-4879-84E5-B93DEAD25DC2}"/>
               </a:ext>
             </a:extLst>
           </p:cNvPr>
-          <p:cNvGraphicFramePr>
-            <a:graphicFrameLocks noGrp="1"/>
-          </p:cNvGraphicFramePr>
-          <p:nvPr>
-            <p:extLst>
-              <p:ext uri="{D42A27DB-BD31-4B8C-83A1-F6EECF244321}">
-                <p14:modId xmlns:p14="http://schemas.microsoft.com/office/powerpoint/2010/main" val="3025195131"/>
-              </p:ext>
-            </p:extLst>
-          </p:nvPr>
-        </p:nvGraphicFramePr>
-        <p:xfrm>
-          <a:off x="762000" y="1150260"/>
-          <a:ext cx="10084906" cy="5461221"/>
-        </p:xfrm>
-        <a:graphic>
-          <a:graphicData uri="http://schemas.openxmlformats.org/drawingml/2006/table">
-            <a:tbl>
-              <a:tblPr firstRow="1" firstCol="1" bandRow="1">
-                <a:tableStyleId>{5C22544A-7EE6-4342-B048-85BDC9FD1C3A}</a:tableStyleId>
-              </a:tblPr>
-              <a:tblGrid>
-                <a:gridCol w="1456779">
-                  <a:extLst>
-                    <a:ext uri="{9D8B030D-6E8A-4147-A177-3AD203B41FA5}">
-                      <a16:colId xmlns:a16="http://schemas.microsoft.com/office/drawing/2014/main" val="1825148206"/>
-                    </a:ext>
-                  </a:extLst>
-                </a:gridCol>
-                <a:gridCol w="1346362">
-                  <a:extLst>
-                    <a:ext uri="{9D8B030D-6E8A-4147-A177-3AD203B41FA5}">
-                      <a16:colId xmlns:a16="http://schemas.microsoft.com/office/drawing/2014/main" val="3761278777"/>
-                    </a:ext>
-                  </a:extLst>
-                </a:gridCol>
-                <a:gridCol w="948220">
-                  <a:extLst>
-                    <a:ext uri="{9D8B030D-6E8A-4147-A177-3AD203B41FA5}">
-                      <a16:colId xmlns:a16="http://schemas.microsoft.com/office/drawing/2014/main" val="3797800888"/>
-                    </a:ext>
-                  </a:extLst>
-                </a:gridCol>
-                <a:gridCol w="1509113">
-                  <a:extLst>
-                    <a:ext uri="{9D8B030D-6E8A-4147-A177-3AD203B41FA5}">
-                      <a16:colId xmlns:a16="http://schemas.microsoft.com/office/drawing/2014/main" val="1836078427"/>
-                    </a:ext>
-                  </a:extLst>
-                </a:gridCol>
-                <a:gridCol w="1078147">
-                  <a:extLst>
-                    <a:ext uri="{9D8B030D-6E8A-4147-A177-3AD203B41FA5}">
-                      <a16:colId xmlns:a16="http://schemas.microsoft.com/office/drawing/2014/main" val="1792889612"/>
-                    </a:ext>
-                  </a:extLst>
-                </a:gridCol>
-                <a:gridCol w="1183159">
-                  <a:extLst>
-                    <a:ext uri="{9D8B030D-6E8A-4147-A177-3AD203B41FA5}">
-                      <a16:colId xmlns:a16="http://schemas.microsoft.com/office/drawing/2014/main" val="3990130837"/>
-                    </a:ext>
-                  </a:extLst>
-                </a:gridCol>
-                <a:gridCol w="1064143">
-                  <a:extLst>
-                    <a:ext uri="{9D8B030D-6E8A-4147-A177-3AD203B41FA5}">
-                      <a16:colId xmlns:a16="http://schemas.microsoft.com/office/drawing/2014/main" val="781140040"/>
-                    </a:ext>
-                  </a:extLst>
-                </a:gridCol>
-                <a:gridCol w="786225">
-                  <a:extLst>
-                    <a:ext uri="{9D8B030D-6E8A-4147-A177-3AD203B41FA5}">
-                      <a16:colId xmlns:a16="http://schemas.microsoft.com/office/drawing/2014/main" val="2073514481"/>
-                    </a:ext>
-                  </a:extLst>
-                </a:gridCol>
-                <a:gridCol w="712758">
-                  <a:extLst>
-                    <a:ext uri="{9D8B030D-6E8A-4147-A177-3AD203B41FA5}">
-                      <a16:colId xmlns:a16="http://schemas.microsoft.com/office/drawing/2014/main" val="1979077869"/>
-                    </a:ext>
-                  </a:extLst>
-                </a:gridCol>
-              </a:tblGrid>
-              <a:tr h="919692">
-                <a:tc>
-                  <a:txBody>
-                    <a:bodyPr/>
-                    <a:lstStyle/>
-                    <a:p>
-                      <a:r>
-                        <a:rPr lang="pt-PT" sz="800" dirty="0"/>
-                        <a:t>                Relaciona-se com a</a:t>
-                      </a:r>
-                    </a:p>
-                    <a:p>
-                      <a:r>
-                        <a:rPr lang="pt-PT" sz="800" dirty="0"/>
-                        <a:t>                                     classe:</a:t>
-                      </a:r>
-                    </a:p>
-                    <a:p>
-                      <a:r>
-                        <a:rPr lang="pt-PT" sz="800" dirty="0"/>
-                        <a:t>A </a:t>
-                      </a:r>
-                    </a:p>
-                    <a:p>
-                      <a:r>
-                        <a:rPr lang="pt-PT" sz="800" dirty="0"/>
-                        <a:t>classe:</a:t>
-                      </a:r>
-                    </a:p>
-                  </a:txBody>
-                  <a:tcPr/>
-                </a:tc>
-                <a:tc>
-                  <a:txBody>
-                    <a:bodyPr/>
-                    <a:lstStyle/>
-                    <a:p>
-                      <a:r>
-                        <a:rPr lang="pt-PT" sz="1050" dirty="0" err="1"/>
-                        <a:t>Company</a:t>
-                      </a:r>
-                      <a:endParaRPr lang="pt-PT" sz="1050" dirty="0"/>
-                    </a:p>
-                  </a:txBody>
-                  <a:tcPr/>
-                </a:tc>
-                <a:tc>
-                  <a:txBody>
-                    <a:bodyPr/>
-                    <a:lstStyle/>
-                    <a:p>
-                      <a:r>
-                        <a:rPr lang="pt-PT" sz="1050" dirty="0" err="1"/>
-                        <a:t>Employees</a:t>
-                      </a:r>
-                      <a:endParaRPr lang="pt-PT" sz="1050" dirty="0"/>
-                    </a:p>
-                  </a:txBody>
-                  <a:tcPr/>
-                </a:tc>
-                <a:tc>
-                  <a:txBody>
-                    <a:bodyPr/>
-                    <a:lstStyle/>
-                    <a:p>
-                      <a:r>
-                        <a:rPr lang="pt-PT" sz="1050" dirty="0" err="1"/>
-                        <a:t>Flights</a:t>
-                      </a:r>
-                      <a:endParaRPr lang="pt-PT" sz="1050" dirty="0"/>
-                    </a:p>
-                  </a:txBody>
-                  <a:tcPr/>
-                </a:tc>
-                <a:tc>
-                  <a:txBody>
-                    <a:bodyPr/>
-                    <a:lstStyle/>
-                    <a:p>
-                      <a:r>
-                        <a:rPr lang="pt-PT" sz="1050" dirty="0"/>
-                        <a:t>Planes</a:t>
-                      </a:r>
-                    </a:p>
-                  </a:txBody>
-                  <a:tcPr/>
-                </a:tc>
-                <a:tc>
-                  <a:txBody>
-                    <a:bodyPr/>
-                    <a:lstStyle/>
-                    <a:p>
-                      <a:r>
-                        <a:rPr lang="pt-PT" sz="1050" dirty="0" err="1"/>
-                        <a:t>Services</a:t>
-                      </a:r>
-                      <a:endParaRPr lang="pt-PT" sz="1050" dirty="0"/>
-                    </a:p>
-                  </a:txBody>
-                  <a:tcPr/>
-                </a:tc>
-                <a:tc>
-                  <a:txBody>
-                    <a:bodyPr/>
-                    <a:lstStyle/>
-                    <a:p>
-                      <a:r>
-                        <a:rPr lang="pt-PT" sz="1050" dirty="0"/>
-                        <a:t>Tickets</a:t>
-                      </a:r>
-                    </a:p>
-                  </a:txBody>
-                  <a:tcPr/>
-                </a:tc>
-                <a:tc>
-                  <a:txBody>
-                    <a:bodyPr/>
-                    <a:lstStyle/>
-                    <a:p>
-                      <a:r>
-                        <a:rPr lang="pt-PT" sz="1050" dirty="0"/>
-                        <a:t>Menu</a:t>
-                      </a:r>
-                    </a:p>
-                  </a:txBody>
-                  <a:tcPr/>
-                </a:tc>
-                <a:tc>
-                  <a:txBody>
-                    <a:bodyPr/>
-                    <a:lstStyle/>
-                    <a:p>
-                      <a:r>
-                        <a:rPr lang="pt-PT" sz="1050" dirty="0" err="1"/>
-                        <a:t>Main</a:t>
-                      </a:r>
-                      <a:endParaRPr lang="pt-PT" sz="1050" dirty="0"/>
-                    </a:p>
-                  </a:txBody>
-                  <a:tcPr/>
-                </a:tc>
-                <a:extLst>
-                  <a:ext uri="{0D108BD9-81ED-4DB2-BD59-A6C34878D82A}">
-                    <a16:rowId xmlns:a16="http://schemas.microsoft.com/office/drawing/2014/main" val="1962798428"/>
-                  </a:ext>
-                </a:extLst>
-              </a:tr>
-              <a:tr h="489513">
-                <a:tc>
-                  <a:txBody>
-                    <a:bodyPr/>
-                    <a:lstStyle/>
-                    <a:p>
-                      <a:r>
-                        <a:rPr lang="pt-PT" sz="1050" dirty="0" err="1"/>
-                        <a:t>Company</a:t>
-                      </a:r>
-                      <a:endParaRPr lang="pt-PT" sz="1050" dirty="0"/>
-                    </a:p>
-                  </a:txBody>
-                  <a:tcPr/>
-                </a:tc>
-                <a:tc>
-                  <a:txBody>
-                    <a:bodyPr/>
-                    <a:lstStyle/>
-                    <a:p>
-                      <a:r>
-                        <a:rPr lang="pt-PT" sz="900" b="1" dirty="0" err="1"/>
-                        <a:t>company</a:t>
-                      </a:r>
-                      <a:r>
-                        <a:rPr lang="pt-PT" sz="900" b="1" dirty="0"/>
-                        <a:t>. </a:t>
-                      </a:r>
-                      <a:r>
-                        <a:rPr lang="pt-PT" sz="900" b="1" dirty="0" err="1"/>
-                        <a:t>cpp</a:t>
-                      </a:r>
-                      <a:endParaRPr lang="pt-PT" sz="900" b="1" dirty="0"/>
-                    </a:p>
-                    <a:p>
-                      <a:r>
-                        <a:rPr lang="pt-PT" sz="900" dirty="0"/>
-                        <a:t>inclui</a:t>
-                      </a:r>
-                    </a:p>
-                    <a:p>
-                      <a:r>
-                        <a:rPr lang="pt-PT" sz="900" b="1" dirty="0" err="1"/>
-                        <a:t>company.h</a:t>
-                      </a:r>
-                      <a:endParaRPr lang="pt-PT" sz="900" b="1" dirty="0"/>
-                    </a:p>
-                  </a:txBody>
-                  <a:tcPr/>
-                </a:tc>
-                <a:tc>
-                  <a:txBody>
-                    <a:bodyPr/>
-                    <a:lstStyle/>
-                    <a:p>
-                      <a:endParaRPr lang="pt-PT" sz="900" dirty="0"/>
-                    </a:p>
-                  </a:txBody>
-                  <a:tcPr/>
-                </a:tc>
-                <a:tc>
-                  <a:txBody>
-                    <a:bodyPr/>
-                    <a:lstStyle/>
-                    <a:p>
-                      <a:r>
-                        <a:rPr lang="pt-PT" sz="900" b="1" dirty="0" err="1"/>
-                        <a:t>company.h</a:t>
-                      </a:r>
-                      <a:r>
-                        <a:rPr lang="pt-PT" sz="900" dirty="0"/>
-                        <a:t> inclui </a:t>
-                      </a:r>
-                      <a:r>
-                        <a:rPr lang="pt-PT" sz="900" b="1" dirty="0" err="1"/>
-                        <a:t>flights.h</a:t>
-                      </a:r>
-                      <a:endParaRPr lang="pt-PT" sz="900" b="1" dirty="0"/>
-                    </a:p>
-                  </a:txBody>
-                  <a:tcPr/>
-                </a:tc>
-                <a:tc>
-                  <a:txBody>
-                    <a:bodyPr/>
-                    <a:lstStyle/>
-                    <a:p>
-                      <a:r>
-                        <a:rPr lang="pt-PT" sz="900" b="1" dirty="0" err="1"/>
-                        <a:t>company.h</a:t>
-                      </a:r>
-                      <a:endParaRPr lang="pt-PT" sz="900" b="1" dirty="0"/>
-                    </a:p>
-                    <a:p>
-                      <a:r>
-                        <a:rPr lang="pt-PT" sz="900" dirty="0"/>
-                        <a:t>inclui</a:t>
-                      </a:r>
-                    </a:p>
-                    <a:p>
-                      <a:r>
-                        <a:rPr lang="pt-PT" sz="900" b="1" dirty="0" err="1"/>
-                        <a:t>planes.h</a:t>
-                      </a:r>
-                      <a:endParaRPr lang="pt-PT" sz="900" b="1" dirty="0"/>
-                    </a:p>
-                  </a:txBody>
-                  <a:tcPr/>
-                </a:tc>
-                <a:tc>
-                  <a:txBody>
-                    <a:bodyPr/>
-                    <a:lstStyle/>
-                    <a:p>
-                      <a:endParaRPr lang="pt-PT" sz="900"/>
-                    </a:p>
-                  </a:txBody>
-                  <a:tcPr/>
-                </a:tc>
-                <a:tc>
-                  <a:txBody>
-                    <a:bodyPr/>
-                    <a:lstStyle/>
-                    <a:p>
-                      <a:endParaRPr lang="pt-PT" sz="900" dirty="0"/>
-                    </a:p>
-                  </a:txBody>
-                  <a:tcPr/>
-                </a:tc>
-                <a:tc>
-                  <a:txBody>
-                    <a:bodyPr/>
-                    <a:lstStyle/>
-                    <a:p>
-                      <a:endParaRPr lang="pt-PT" sz="900" dirty="0"/>
-                    </a:p>
-                  </a:txBody>
-                  <a:tcPr/>
-                </a:tc>
-                <a:tc>
-                  <a:txBody>
-                    <a:bodyPr/>
-                    <a:lstStyle/>
-                    <a:p>
-                      <a:endParaRPr lang="pt-PT" sz="900" dirty="0"/>
-                    </a:p>
-                  </a:txBody>
-                  <a:tcPr/>
-                </a:tc>
-                <a:extLst>
-                  <a:ext uri="{0D108BD9-81ED-4DB2-BD59-A6C34878D82A}">
-                    <a16:rowId xmlns:a16="http://schemas.microsoft.com/office/drawing/2014/main" val="470813424"/>
-                  </a:ext>
-                </a:extLst>
-              </a:tr>
-              <a:tr h="623016">
-                <a:tc>
-                  <a:txBody>
-                    <a:bodyPr/>
-                    <a:lstStyle/>
-                    <a:p>
-                      <a:r>
-                        <a:rPr lang="pt-PT" sz="1050" dirty="0" err="1"/>
-                        <a:t>Employees</a:t>
-                      </a:r>
-                      <a:endParaRPr lang="pt-PT" sz="1050" dirty="0"/>
-                    </a:p>
-                  </a:txBody>
-                  <a:tcPr/>
-                </a:tc>
-                <a:tc>
-                  <a:txBody>
-                    <a:bodyPr/>
-                    <a:lstStyle/>
-                    <a:p>
-                      <a:endParaRPr lang="pt-PT" sz="900" dirty="0"/>
-                    </a:p>
-                  </a:txBody>
-                  <a:tcPr/>
-                </a:tc>
-                <a:tc>
-                  <a:txBody>
-                    <a:bodyPr/>
-                    <a:lstStyle/>
-                    <a:p>
-                      <a:r>
-                        <a:rPr lang="pt-PT" sz="900" b="1" dirty="0"/>
-                        <a:t>employees.cpp</a:t>
-                      </a:r>
-                    </a:p>
-                    <a:p>
-                      <a:r>
-                        <a:rPr lang="pt-PT" sz="900" dirty="0"/>
-                        <a:t>inclui</a:t>
-                      </a:r>
-                    </a:p>
-                    <a:p>
-                      <a:r>
-                        <a:rPr lang="pt-PT" sz="900" b="1" dirty="0" err="1"/>
-                        <a:t>employees.h</a:t>
-                      </a:r>
-                      <a:endParaRPr lang="pt-PT" sz="900" b="1" dirty="0"/>
-                    </a:p>
-                  </a:txBody>
-                  <a:tcPr/>
-                </a:tc>
-                <a:tc>
-                  <a:txBody>
-                    <a:bodyPr/>
-                    <a:lstStyle/>
-                    <a:p>
-                      <a:endParaRPr lang="pt-PT" sz="900" dirty="0"/>
-                    </a:p>
-                  </a:txBody>
-                  <a:tcPr/>
-                </a:tc>
-                <a:tc>
-                  <a:txBody>
-                    <a:bodyPr/>
-                    <a:lstStyle/>
-                    <a:p>
-                      <a:endParaRPr lang="pt-PT" sz="900"/>
-                    </a:p>
-                  </a:txBody>
-                  <a:tcPr/>
-                </a:tc>
-                <a:tc>
-                  <a:txBody>
-                    <a:bodyPr/>
-                    <a:lstStyle/>
-                    <a:p>
-                      <a:endParaRPr lang="pt-PT" sz="900"/>
-                    </a:p>
-                  </a:txBody>
-                  <a:tcPr/>
-                </a:tc>
-                <a:tc>
-                  <a:txBody>
-                    <a:bodyPr/>
-                    <a:lstStyle/>
-                    <a:p>
-                      <a:endParaRPr lang="pt-PT" sz="900" dirty="0"/>
-                    </a:p>
-                  </a:txBody>
-                  <a:tcPr/>
-                </a:tc>
-                <a:tc>
-                  <a:txBody>
-                    <a:bodyPr/>
-                    <a:lstStyle/>
-                    <a:p>
-                      <a:endParaRPr lang="pt-PT" sz="900" dirty="0"/>
-                    </a:p>
-                  </a:txBody>
-                  <a:tcPr/>
-                </a:tc>
-                <a:tc>
-                  <a:txBody>
-                    <a:bodyPr/>
-                    <a:lstStyle/>
-                    <a:p>
-                      <a:endParaRPr lang="pt-PT" sz="900" dirty="0"/>
-                    </a:p>
-                  </a:txBody>
-                  <a:tcPr/>
-                </a:tc>
-                <a:extLst>
-                  <a:ext uri="{0D108BD9-81ED-4DB2-BD59-A6C34878D82A}">
-                    <a16:rowId xmlns:a16="http://schemas.microsoft.com/office/drawing/2014/main" val="1955413251"/>
-                  </a:ext>
-                </a:extLst>
-              </a:tr>
-              <a:tr h="489513">
-                <a:tc>
-                  <a:txBody>
-                    <a:bodyPr/>
-                    <a:lstStyle/>
-                    <a:p>
-                      <a:r>
-                        <a:rPr lang="pt-PT" sz="1050" dirty="0" err="1"/>
-                        <a:t>Flights</a:t>
-                      </a:r>
-                      <a:endParaRPr lang="pt-PT" sz="1050" dirty="0"/>
-                    </a:p>
-                  </a:txBody>
-                  <a:tcPr/>
-                </a:tc>
-                <a:tc>
-                  <a:txBody>
-                    <a:bodyPr/>
-                    <a:lstStyle/>
-                    <a:p>
-                      <a:r>
-                        <a:rPr lang="pt-PT" sz="900" b="1" dirty="0" err="1"/>
-                        <a:t>flights.h</a:t>
-                      </a:r>
-                      <a:endParaRPr lang="pt-PT" sz="900" b="1" dirty="0"/>
-                    </a:p>
-                    <a:p>
-                      <a:r>
-                        <a:rPr lang="pt-PT" sz="900" dirty="0"/>
-                        <a:t>inclui</a:t>
-                      </a:r>
-                    </a:p>
-                    <a:p>
-                      <a:r>
-                        <a:rPr lang="pt-PT" sz="900" b="1" dirty="0" err="1"/>
-                        <a:t>company.h</a:t>
-                      </a:r>
-                      <a:endParaRPr lang="pt-PT" sz="900" b="1" dirty="0"/>
-                    </a:p>
-                  </a:txBody>
-                  <a:tcPr/>
-                </a:tc>
-                <a:tc>
-                  <a:txBody>
-                    <a:bodyPr/>
-                    <a:lstStyle/>
-                    <a:p>
-                      <a:endParaRPr lang="pt-PT" sz="900" dirty="0"/>
-                    </a:p>
-                  </a:txBody>
-                  <a:tcPr/>
-                </a:tc>
-                <a:tc>
-                  <a:txBody>
-                    <a:bodyPr/>
-                    <a:lstStyle/>
-                    <a:p>
-                      <a:r>
-                        <a:rPr lang="pt-PT" sz="900" b="1" dirty="0"/>
-                        <a:t>flights.cpp </a:t>
-                      </a:r>
-                      <a:r>
-                        <a:rPr lang="pt-PT" sz="900" dirty="0"/>
-                        <a:t>inclui </a:t>
-                      </a:r>
-                      <a:r>
-                        <a:rPr lang="pt-PT" sz="900" b="1" dirty="0" err="1"/>
-                        <a:t>flights.h</a:t>
-                      </a:r>
-                      <a:endParaRPr lang="pt-PT" sz="900" b="1" dirty="0"/>
-                    </a:p>
-                  </a:txBody>
-                  <a:tcPr/>
-                </a:tc>
-                <a:tc>
-                  <a:txBody>
-                    <a:bodyPr/>
-                    <a:lstStyle/>
-                    <a:p>
-                      <a:r>
-                        <a:rPr lang="pt-PT" sz="900" b="1" dirty="0"/>
-                        <a:t>flights.cpp </a:t>
-                      </a:r>
-                      <a:r>
-                        <a:rPr lang="pt-PT" sz="900" dirty="0"/>
-                        <a:t>inclui </a:t>
-                      </a:r>
-                      <a:r>
-                        <a:rPr lang="pt-PT" sz="900" b="1" dirty="0" err="1"/>
-                        <a:t>planes.h</a:t>
-                      </a:r>
-                      <a:endParaRPr lang="pt-PT" sz="900" b="1" dirty="0"/>
-                    </a:p>
-                  </a:txBody>
-                  <a:tcPr/>
-                </a:tc>
-                <a:tc>
-                  <a:txBody>
-                    <a:bodyPr/>
-                    <a:lstStyle/>
-                    <a:p>
-                      <a:endParaRPr lang="pt-PT" sz="900" dirty="0"/>
-                    </a:p>
-                  </a:txBody>
-                  <a:tcPr/>
-                </a:tc>
-                <a:tc>
-                  <a:txBody>
-                    <a:bodyPr/>
-                    <a:lstStyle/>
-                    <a:p>
-                      <a:endParaRPr lang="pt-PT" sz="900" dirty="0"/>
-                    </a:p>
-                  </a:txBody>
-                  <a:tcPr/>
-                </a:tc>
-                <a:tc>
-                  <a:txBody>
-                    <a:bodyPr/>
-                    <a:lstStyle/>
-                    <a:p>
-                      <a:endParaRPr lang="pt-PT" sz="900" dirty="0"/>
-                    </a:p>
-                  </a:txBody>
-                  <a:tcPr/>
-                </a:tc>
-                <a:tc>
-                  <a:txBody>
-                    <a:bodyPr/>
-                    <a:lstStyle/>
-                    <a:p>
-                      <a:endParaRPr lang="pt-PT" sz="900" dirty="0"/>
-                    </a:p>
-                  </a:txBody>
-                  <a:tcPr/>
-                </a:tc>
-                <a:extLst>
-                  <a:ext uri="{0D108BD9-81ED-4DB2-BD59-A6C34878D82A}">
-                    <a16:rowId xmlns:a16="http://schemas.microsoft.com/office/drawing/2014/main" val="3459147227"/>
-                  </a:ext>
-                </a:extLst>
-              </a:tr>
-              <a:tr h="489513">
-                <a:tc>
-                  <a:txBody>
-                    <a:bodyPr/>
-                    <a:lstStyle/>
-                    <a:p>
-                      <a:r>
-                        <a:rPr lang="pt-PT" sz="1050" dirty="0"/>
-                        <a:t>Planes</a:t>
-                      </a:r>
-                    </a:p>
-                  </a:txBody>
-                  <a:tcPr/>
-                </a:tc>
-                <a:tc>
-                  <a:txBody>
-                    <a:bodyPr/>
-                    <a:lstStyle/>
-                    <a:p>
-                      <a:r>
-                        <a:rPr lang="pt-PT" sz="900" b="1" dirty="0"/>
-                        <a:t>planes.cpp </a:t>
-                      </a:r>
-                      <a:r>
-                        <a:rPr lang="pt-PT" sz="900" b="0" dirty="0"/>
-                        <a:t>e</a:t>
-                      </a:r>
-                      <a:r>
-                        <a:rPr lang="pt-PT" sz="900" b="1" dirty="0"/>
-                        <a:t> </a:t>
-                      </a:r>
-                      <a:r>
-                        <a:rPr lang="pt-PT" sz="900" b="1" dirty="0" err="1"/>
-                        <a:t>planes.h</a:t>
-                      </a:r>
-                      <a:r>
-                        <a:rPr lang="pt-PT" sz="900" b="1" dirty="0"/>
-                        <a:t> </a:t>
-                      </a:r>
-                      <a:r>
-                        <a:rPr lang="pt-PT" sz="900" dirty="0"/>
-                        <a:t>incluem </a:t>
-                      </a:r>
-                      <a:r>
-                        <a:rPr lang="pt-PT" sz="900" b="1" dirty="0" err="1"/>
-                        <a:t>company.h</a:t>
-                      </a:r>
-                      <a:endParaRPr lang="pt-PT" sz="900" b="1" dirty="0"/>
-                    </a:p>
-                  </a:txBody>
-                  <a:tcPr/>
-                </a:tc>
-                <a:tc>
-                  <a:txBody>
-                    <a:bodyPr/>
-                    <a:lstStyle/>
-                    <a:p>
-                      <a:endParaRPr lang="pt-PT" sz="900" dirty="0"/>
-                    </a:p>
-                  </a:txBody>
-                  <a:tcPr/>
-                </a:tc>
-                <a:tc>
-                  <a:txBody>
-                    <a:bodyPr/>
-                    <a:lstStyle/>
-                    <a:p>
-                      <a:r>
-                        <a:rPr lang="pt-PT" sz="900" b="1" dirty="0" err="1"/>
-                        <a:t>planes.h</a:t>
-                      </a:r>
-                      <a:r>
-                        <a:rPr lang="pt-PT" sz="900" b="1" dirty="0"/>
-                        <a:t> </a:t>
-                      </a:r>
-                      <a:r>
-                        <a:rPr lang="pt-PT" sz="900" dirty="0"/>
-                        <a:t>inclui </a:t>
-                      </a:r>
-                      <a:r>
-                        <a:rPr lang="pt-PT" sz="900" b="1" dirty="0" err="1"/>
-                        <a:t>flights.h</a:t>
-                      </a:r>
-                      <a:endParaRPr lang="pt-PT" sz="900" b="1" dirty="0"/>
-                    </a:p>
-                  </a:txBody>
-                  <a:tcPr/>
-                </a:tc>
-                <a:tc>
-                  <a:txBody>
-                    <a:bodyPr/>
-                    <a:lstStyle/>
-                    <a:p>
-                      <a:r>
-                        <a:rPr lang="pt-PT" sz="900" b="1" dirty="0"/>
-                        <a:t>planes.cpp</a:t>
-                      </a:r>
-                    </a:p>
-                    <a:p>
-                      <a:r>
-                        <a:rPr lang="pt-PT" sz="900" dirty="0"/>
-                        <a:t>inclui</a:t>
-                      </a:r>
-                    </a:p>
-                    <a:p>
-                      <a:r>
-                        <a:rPr lang="pt-PT" sz="900" b="1" dirty="0" err="1"/>
-                        <a:t>planes.h</a:t>
-                      </a:r>
-                      <a:endParaRPr lang="pt-PT" sz="900" b="1" dirty="0"/>
-                    </a:p>
-                  </a:txBody>
-                  <a:tcPr/>
-                </a:tc>
-                <a:tc>
-                  <a:txBody>
-                    <a:bodyPr/>
-                    <a:lstStyle/>
-                    <a:p>
-                      <a:endParaRPr lang="pt-PT" sz="900" dirty="0"/>
-                    </a:p>
-                  </a:txBody>
-                  <a:tcPr/>
-                </a:tc>
-                <a:tc>
-                  <a:txBody>
-                    <a:bodyPr/>
-                    <a:lstStyle/>
-                    <a:p>
-                      <a:endParaRPr lang="pt-PT" sz="900" dirty="0"/>
-                    </a:p>
-                  </a:txBody>
-                  <a:tcPr/>
-                </a:tc>
-                <a:tc>
-                  <a:txBody>
-                    <a:bodyPr/>
-                    <a:lstStyle/>
-                    <a:p>
-                      <a:endParaRPr lang="pt-PT" sz="900" dirty="0"/>
-                    </a:p>
-                  </a:txBody>
-                  <a:tcPr/>
-                </a:tc>
-                <a:tc>
-                  <a:txBody>
-                    <a:bodyPr/>
-                    <a:lstStyle/>
-                    <a:p>
-                      <a:endParaRPr lang="pt-PT" sz="900" dirty="0"/>
-                    </a:p>
-                  </a:txBody>
-                  <a:tcPr/>
-                </a:tc>
-                <a:extLst>
-                  <a:ext uri="{0D108BD9-81ED-4DB2-BD59-A6C34878D82A}">
-                    <a16:rowId xmlns:a16="http://schemas.microsoft.com/office/drawing/2014/main" val="2392658652"/>
-                  </a:ext>
-                </a:extLst>
-              </a:tr>
-              <a:tr h="489513">
-                <a:tc>
-                  <a:txBody>
-                    <a:bodyPr/>
-                    <a:lstStyle/>
-                    <a:p>
-                      <a:r>
-                        <a:rPr lang="pt-PT" sz="1050" dirty="0" err="1"/>
-                        <a:t>Services</a:t>
-                      </a:r>
-                      <a:endParaRPr lang="pt-PT" sz="1050" dirty="0"/>
-                    </a:p>
-                  </a:txBody>
-                  <a:tcPr/>
-                </a:tc>
-                <a:tc>
-                  <a:txBody>
-                    <a:bodyPr/>
-                    <a:lstStyle/>
-                    <a:p>
-                      <a:endParaRPr lang="pt-PT" sz="900" dirty="0"/>
-                    </a:p>
-                  </a:txBody>
-                  <a:tcPr/>
-                </a:tc>
-                <a:tc>
-                  <a:txBody>
-                    <a:bodyPr/>
-                    <a:lstStyle/>
-                    <a:p>
-                      <a:r>
-                        <a:rPr lang="pt-PT" sz="900" b="1" dirty="0" err="1"/>
-                        <a:t>services.h</a:t>
-                      </a:r>
-                      <a:r>
-                        <a:rPr lang="pt-PT" sz="900" b="1" dirty="0"/>
-                        <a:t> </a:t>
-                      </a:r>
-                      <a:r>
-                        <a:rPr lang="pt-PT" sz="900" dirty="0"/>
-                        <a:t>inclui </a:t>
-                      </a:r>
-                      <a:r>
-                        <a:rPr lang="pt-PT" sz="900" b="1" dirty="0" err="1"/>
-                        <a:t>employees.h</a:t>
-                      </a:r>
-                      <a:endParaRPr lang="pt-PT" sz="900" b="1" dirty="0"/>
-                    </a:p>
-                  </a:txBody>
-                  <a:tcPr/>
-                </a:tc>
-                <a:tc>
-                  <a:txBody>
-                    <a:bodyPr/>
-                    <a:lstStyle/>
-                    <a:p>
-                      <a:endParaRPr lang="pt-PT" sz="900" dirty="0"/>
-                    </a:p>
-                  </a:txBody>
-                  <a:tcPr/>
-                </a:tc>
-                <a:tc>
-                  <a:txBody>
-                    <a:bodyPr/>
-                    <a:lstStyle/>
-                    <a:p>
-                      <a:endParaRPr lang="pt-PT" sz="900" dirty="0"/>
-                    </a:p>
-                  </a:txBody>
-                  <a:tcPr/>
-                </a:tc>
-                <a:tc>
-                  <a:txBody>
-                    <a:bodyPr/>
-                    <a:lstStyle/>
-                    <a:p>
-                      <a:r>
-                        <a:rPr lang="pt-PT" sz="900" b="1" dirty="0"/>
-                        <a:t>services.cpp </a:t>
-                      </a:r>
-                      <a:r>
-                        <a:rPr lang="pt-PT" sz="900" dirty="0"/>
-                        <a:t>inclui</a:t>
-                      </a:r>
-                    </a:p>
-                    <a:p>
-                      <a:r>
-                        <a:rPr lang="pt-PT" sz="900" b="1" dirty="0" err="1"/>
-                        <a:t>services.h</a:t>
-                      </a:r>
-                      <a:endParaRPr lang="pt-PT" sz="900" b="1" dirty="0"/>
-                    </a:p>
-                  </a:txBody>
-                  <a:tcPr/>
-                </a:tc>
-                <a:tc>
-                  <a:txBody>
-                    <a:bodyPr/>
-                    <a:lstStyle/>
-                    <a:p>
-                      <a:endParaRPr lang="pt-PT" sz="900" dirty="0"/>
-                    </a:p>
-                    <a:p>
-                      <a:endParaRPr lang="pt-PT" sz="900" dirty="0"/>
-                    </a:p>
-                  </a:txBody>
-                  <a:tcPr/>
-                </a:tc>
-                <a:tc>
-                  <a:txBody>
-                    <a:bodyPr/>
-                    <a:lstStyle/>
-                    <a:p>
-                      <a:endParaRPr lang="pt-PT" sz="900" dirty="0"/>
-                    </a:p>
-                  </a:txBody>
-                  <a:tcPr/>
-                </a:tc>
-                <a:tc>
-                  <a:txBody>
-                    <a:bodyPr/>
-                    <a:lstStyle/>
-                    <a:p>
-                      <a:endParaRPr lang="pt-PT" sz="900" dirty="0"/>
-                    </a:p>
-                  </a:txBody>
-                  <a:tcPr/>
-                </a:tc>
-                <a:extLst>
-                  <a:ext uri="{0D108BD9-81ED-4DB2-BD59-A6C34878D82A}">
-                    <a16:rowId xmlns:a16="http://schemas.microsoft.com/office/drawing/2014/main" val="4284462962"/>
-                  </a:ext>
-                </a:extLst>
-              </a:tr>
-              <a:tr h="489513">
-                <a:tc>
-                  <a:txBody>
-                    <a:bodyPr/>
-                    <a:lstStyle/>
-                    <a:p>
-                      <a:r>
-                        <a:rPr lang="pt-PT" sz="1050" dirty="0"/>
-                        <a:t>Tickets</a:t>
-                      </a:r>
-                    </a:p>
-                  </a:txBody>
-                  <a:tcPr/>
-                </a:tc>
-                <a:tc>
-                  <a:txBody>
-                    <a:bodyPr/>
-                    <a:lstStyle/>
-                    <a:p>
-                      <a:endParaRPr lang="pt-PT" sz="900" dirty="0"/>
-                    </a:p>
-                  </a:txBody>
-                  <a:tcPr/>
-                </a:tc>
-                <a:tc>
-                  <a:txBody>
-                    <a:bodyPr/>
-                    <a:lstStyle/>
-                    <a:p>
-                      <a:endParaRPr lang="pt-PT" sz="900" dirty="0"/>
-                    </a:p>
-                  </a:txBody>
-                  <a:tcPr/>
-                </a:tc>
-                <a:tc>
-                  <a:txBody>
-                    <a:bodyPr/>
-                    <a:lstStyle/>
-                    <a:p>
-                      <a:r>
-                        <a:rPr lang="pt-PT" sz="900" b="1" dirty="0" err="1"/>
-                        <a:t>tickets.h</a:t>
-                      </a:r>
-                      <a:r>
-                        <a:rPr lang="pt-PT" sz="900" b="1" dirty="0"/>
-                        <a:t> </a:t>
-                      </a:r>
-                      <a:r>
-                        <a:rPr lang="pt-PT" sz="900" dirty="0"/>
-                        <a:t>inclui </a:t>
-                      </a:r>
-                      <a:r>
-                        <a:rPr lang="pt-PT" sz="900" b="1" dirty="0" err="1"/>
-                        <a:t>flights.h</a:t>
-                      </a:r>
-                      <a:endParaRPr lang="pt-PT" sz="900" b="1" dirty="0"/>
-                    </a:p>
-                  </a:txBody>
-                  <a:tcPr/>
-                </a:tc>
-                <a:tc>
-                  <a:txBody>
-                    <a:bodyPr/>
-                    <a:lstStyle/>
-                    <a:p>
-                      <a:endParaRPr lang="pt-PT" sz="900" dirty="0"/>
-                    </a:p>
-                  </a:txBody>
-                  <a:tcPr/>
-                </a:tc>
-                <a:tc>
-                  <a:txBody>
-                    <a:bodyPr/>
-                    <a:lstStyle/>
-                    <a:p>
-                      <a:endParaRPr lang="pt-PT" sz="900" dirty="0"/>
-                    </a:p>
-                  </a:txBody>
-                  <a:tcPr/>
-                </a:tc>
-                <a:tc>
-                  <a:txBody>
-                    <a:bodyPr/>
-                    <a:lstStyle/>
-                    <a:p>
-                      <a:r>
-                        <a:rPr lang="pt-PT" sz="900" b="1" dirty="0"/>
-                        <a:t>tickets.cpp </a:t>
-                      </a:r>
-                      <a:r>
-                        <a:rPr lang="pt-PT" sz="900" dirty="0"/>
-                        <a:t>inclui</a:t>
-                      </a:r>
-                    </a:p>
-                    <a:p>
-                      <a:r>
-                        <a:rPr lang="pt-PT" sz="900" b="1" dirty="0" err="1"/>
-                        <a:t>tickets.h</a:t>
-                      </a:r>
-                      <a:endParaRPr lang="pt-PT" sz="900" b="1" dirty="0"/>
-                    </a:p>
-                  </a:txBody>
-                  <a:tcPr/>
-                </a:tc>
-                <a:tc>
-                  <a:txBody>
-                    <a:bodyPr/>
-                    <a:lstStyle/>
-                    <a:p>
-                      <a:endParaRPr lang="pt-PT" sz="900" dirty="0"/>
-                    </a:p>
-                  </a:txBody>
-                  <a:tcPr/>
-                </a:tc>
-                <a:tc>
-                  <a:txBody>
-                    <a:bodyPr/>
-                    <a:lstStyle/>
-                    <a:p>
-                      <a:endParaRPr lang="pt-PT" sz="900" dirty="0"/>
-                    </a:p>
-                  </a:txBody>
-                  <a:tcPr/>
-                </a:tc>
-                <a:extLst>
-                  <a:ext uri="{0D108BD9-81ED-4DB2-BD59-A6C34878D82A}">
-                    <a16:rowId xmlns:a16="http://schemas.microsoft.com/office/drawing/2014/main" val="3730788777"/>
-                  </a:ext>
-                </a:extLst>
-              </a:tr>
-              <a:tr h="744941">
-                <a:tc>
-                  <a:txBody>
-                    <a:bodyPr/>
-                    <a:lstStyle/>
-                    <a:p>
-                      <a:r>
-                        <a:rPr lang="pt-PT" sz="1050" dirty="0"/>
-                        <a:t>Menu</a:t>
-                      </a:r>
-                    </a:p>
-                  </a:txBody>
-                  <a:tcPr/>
-                </a:tc>
-                <a:tc>
-                  <a:txBody>
-                    <a:bodyPr/>
-                    <a:lstStyle/>
-                    <a:p>
-                      <a:r>
-                        <a:rPr lang="pt-PT" sz="900" b="1" dirty="0" err="1"/>
-                        <a:t>menu.h</a:t>
-                      </a:r>
-                      <a:r>
-                        <a:rPr lang="pt-PT" sz="900" b="1" dirty="0"/>
-                        <a:t> </a:t>
-                      </a:r>
-                      <a:r>
-                        <a:rPr lang="pt-PT" sz="900" dirty="0"/>
-                        <a:t>inclui </a:t>
-                      </a:r>
-                      <a:r>
-                        <a:rPr lang="pt-PT" sz="900" b="1" dirty="0" err="1"/>
-                        <a:t>company.h</a:t>
-                      </a:r>
-                      <a:endParaRPr lang="pt-PT" sz="900" b="1" dirty="0"/>
-                    </a:p>
-                  </a:txBody>
-                  <a:tcPr/>
-                </a:tc>
-                <a:tc>
-                  <a:txBody>
-                    <a:bodyPr/>
-                    <a:lstStyle/>
-                    <a:p>
-                      <a:endParaRPr lang="pt-PT" sz="900" dirty="0"/>
-                    </a:p>
-                  </a:txBody>
-                  <a:tcPr/>
-                </a:tc>
-                <a:tc>
-                  <a:txBody>
-                    <a:bodyPr/>
-                    <a:lstStyle/>
-                    <a:p>
-                      <a:r>
-                        <a:rPr lang="pt-PT" sz="900" b="1" dirty="0"/>
-                        <a:t>menu.cpp </a:t>
-                      </a:r>
-                      <a:r>
-                        <a:rPr lang="pt-PT" sz="900" dirty="0" err="1"/>
-                        <a:t>inlui</a:t>
-                      </a:r>
-                      <a:r>
-                        <a:rPr lang="pt-PT" sz="900" dirty="0"/>
-                        <a:t> </a:t>
-                      </a:r>
-                      <a:r>
-                        <a:rPr lang="pt-PT" sz="900" b="1" dirty="0" err="1"/>
-                        <a:t>flights.h</a:t>
-                      </a:r>
-                      <a:endParaRPr lang="pt-PT" sz="900" b="1" dirty="0"/>
-                    </a:p>
-                    <a:p>
-                      <a:endParaRPr lang="pt-PT" sz="900" b="1" dirty="0"/>
-                    </a:p>
-                    <a:p>
-                      <a:r>
-                        <a:rPr lang="pt-PT" sz="900" b="1" dirty="0"/>
-                        <a:t>flight_plan.txt</a:t>
-                      </a:r>
-                    </a:p>
-                    <a:p>
-                      <a:r>
-                        <a:rPr lang="pt-PT" sz="900" dirty="0"/>
-                        <a:t>(regista </a:t>
-                      </a:r>
-                      <a:r>
-                        <a:rPr lang="pt-PT" sz="900" dirty="0" err="1"/>
-                        <a:t>info</a:t>
-                      </a:r>
-                      <a:r>
-                        <a:rPr lang="pt-PT" sz="900" dirty="0"/>
-                        <a:t> sobre cada voo)</a:t>
-                      </a:r>
-                    </a:p>
-                    <a:p>
-                      <a:endParaRPr lang="pt-PT" sz="900" b="1" dirty="0"/>
-                    </a:p>
-                  </a:txBody>
-                  <a:tcPr/>
-                </a:tc>
-                <a:tc>
-                  <a:txBody>
-                    <a:bodyPr/>
-                    <a:lstStyle/>
-                    <a:p>
-                      <a:r>
-                        <a:rPr lang="pt-PT" sz="900" b="1" dirty="0"/>
-                        <a:t>planes.txt</a:t>
-                      </a:r>
-                    </a:p>
-                    <a:p>
-                      <a:r>
-                        <a:rPr lang="pt-PT" sz="900" dirty="0"/>
-                        <a:t>(regista </a:t>
-                      </a:r>
-                      <a:r>
-                        <a:rPr lang="pt-PT" sz="900" dirty="0" err="1"/>
-                        <a:t>info</a:t>
-                      </a:r>
-                      <a:r>
-                        <a:rPr lang="pt-PT" sz="900" dirty="0"/>
-                        <a:t> dos aviões)</a:t>
-                      </a:r>
-                    </a:p>
-                  </a:txBody>
-                  <a:tcPr/>
-                </a:tc>
-                <a:tc>
-                  <a:txBody>
-                    <a:bodyPr/>
-                    <a:lstStyle/>
-                    <a:p>
-                      <a:endParaRPr lang="pt-PT" sz="900" dirty="0"/>
-                    </a:p>
-                  </a:txBody>
-                  <a:tcPr/>
-                </a:tc>
-                <a:tc>
-                  <a:txBody>
-                    <a:bodyPr/>
-                    <a:lstStyle/>
-                    <a:p>
-                      <a:endParaRPr lang="pt-PT" sz="900" dirty="0"/>
-                    </a:p>
-                  </a:txBody>
-                  <a:tcPr/>
-                </a:tc>
-                <a:tc>
-                  <a:txBody>
-                    <a:bodyPr/>
-                    <a:lstStyle/>
-                    <a:p>
-                      <a:r>
-                        <a:rPr lang="pt-PT" sz="900" b="1" dirty="0"/>
-                        <a:t>menu.cpp</a:t>
-                      </a:r>
-                    </a:p>
-                    <a:p>
-                      <a:r>
-                        <a:rPr lang="pt-PT" sz="900" dirty="0"/>
-                        <a:t>inclui</a:t>
-                      </a:r>
-                    </a:p>
-                    <a:p>
-                      <a:r>
-                        <a:rPr lang="pt-PT" sz="900" b="1" dirty="0" err="1"/>
-                        <a:t>menu.h</a:t>
-                      </a:r>
-                      <a:endParaRPr lang="pt-PT" sz="900" b="1" dirty="0"/>
-                    </a:p>
-                  </a:txBody>
-                  <a:tcPr/>
-                </a:tc>
-                <a:tc>
-                  <a:txBody>
-                    <a:bodyPr/>
-                    <a:lstStyle/>
-                    <a:p>
-                      <a:endParaRPr lang="pt-PT" sz="900" b="1" dirty="0"/>
-                    </a:p>
-                  </a:txBody>
-                  <a:tcPr/>
-                </a:tc>
-                <a:extLst>
-                  <a:ext uri="{0D108BD9-81ED-4DB2-BD59-A6C34878D82A}">
-                    <a16:rowId xmlns:a16="http://schemas.microsoft.com/office/drawing/2014/main" val="4162208619"/>
-                  </a:ext>
-                </a:extLst>
-              </a:tr>
-              <a:tr h="489513">
-                <a:tc>
-                  <a:txBody>
-                    <a:bodyPr/>
-                    <a:lstStyle/>
-                    <a:p>
-                      <a:r>
-                        <a:rPr lang="pt-PT" sz="1050" dirty="0" err="1"/>
-                        <a:t>Main</a:t>
-                      </a:r>
-                      <a:endParaRPr lang="pt-PT" sz="1050" dirty="0"/>
-                    </a:p>
-                  </a:txBody>
-                  <a:tcPr/>
-                </a:tc>
-                <a:tc>
-                  <a:txBody>
-                    <a:bodyPr/>
-                    <a:lstStyle/>
-                    <a:p>
-                      <a:r>
-                        <a:rPr lang="pt-PT" sz="900" b="1" dirty="0"/>
-                        <a:t>main.cpp</a:t>
-                      </a:r>
-                    </a:p>
-                    <a:p>
-                      <a:r>
-                        <a:rPr lang="pt-PT" sz="900" dirty="0"/>
-                        <a:t>inclui </a:t>
-                      </a:r>
-                      <a:r>
-                        <a:rPr lang="pt-PT" sz="900" b="1" dirty="0" err="1"/>
-                        <a:t>company.h</a:t>
-                      </a:r>
-                      <a:endParaRPr lang="pt-PT" sz="900" b="1" dirty="0"/>
-                    </a:p>
-                    <a:p>
-                      <a:endParaRPr lang="pt-PT" sz="900" dirty="0"/>
-                    </a:p>
-                  </a:txBody>
-                  <a:tcPr/>
-                </a:tc>
-                <a:tc>
-                  <a:txBody>
-                    <a:bodyPr/>
-                    <a:lstStyle/>
-                    <a:p>
-                      <a:endParaRPr lang="pt-PT" sz="900" dirty="0"/>
-                    </a:p>
-                  </a:txBody>
-                  <a:tcPr/>
-                </a:tc>
-                <a:tc>
-                  <a:txBody>
-                    <a:bodyPr/>
-                    <a:lstStyle/>
-                    <a:p>
-                      <a:endParaRPr lang="pt-PT" sz="900" dirty="0"/>
-                    </a:p>
-                  </a:txBody>
-                  <a:tcPr/>
-                </a:tc>
-                <a:tc>
-                  <a:txBody>
-                    <a:bodyPr/>
-                    <a:lstStyle/>
-                    <a:p>
-                      <a:endParaRPr lang="pt-PT" sz="900" dirty="0"/>
-                    </a:p>
-                  </a:txBody>
-                  <a:tcPr/>
-                </a:tc>
-                <a:tc>
-                  <a:txBody>
-                    <a:bodyPr/>
-                    <a:lstStyle/>
-                    <a:p>
-                      <a:endParaRPr lang="pt-PT" sz="900" dirty="0"/>
-                    </a:p>
-                  </a:txBody>
-                  <a:tcPr/>
-                </a:tc>
-                <a:tc>
-                  <a:txBody>
-                    <a:bodyPr/>
-                    <a:lstStyle/>
-                    <a:p>
-                      <a:endParaRPr lang="pt-PT" sz="900" dirty="0"/>
-                    </a:p>
-                  </a:txBody>
-                  <a:tcPr/>
-                </a:tc>
-                <a:tc>
-                  <a:txBody>
-                    <a:bodyPr/>
-                    <a:lstStyle/>
-                    <a:p>
-                      <a:r>
-                        <a:rPr lang="pt-PT" sz="900" b="1" dirty="0"/>
-                        <a:t>main.cpp </a:t>
-                      </a:r>
-                      <a:r>
-                        <a:rPr lang="pt-PT" sz="900" b="0" dirty="0"/>
-                        <a:t>inclui</a:t>
-                      </a:r>
-                      <a:r>
-                        <a:rPr lang="pt-PT" sz="900" b="1" dirty="0"/>
-                        <a:t> </a:t>
-                      </a:r>
-                      <a:r>
-                        <a:rPr lang="pt-PT" sz="900" b="1" dirty="0" err="1"/>
-                        <a:t>menu.h</a:t>
-                      </a:r>
-                      <a:endParaRPr lang="pt-PT" sz="900" b="1" dirty="0"/>
-                    </a:p>
-                  </a:txBody>
-                  <a:tcPr/>
-                </a:tc>
-                <a:tc>
-                  <a:txBody>
-                    <a:bodyPr/>
-                    <a:lstStyle/>
-                    <a:p>
-                      <a:r>
-                        <a:rPr lang="pt-PT" sz="900" b="1" dirty="0"/>
-                        <a:t>main.cpp</a:t>
-                      </a:r>
-                    </a:p>
-                  </a:txBody>
-                  <a:tcPr/>
-                </a:tc>
-                <a:extLst>
-                  <a:ext uri="{0D108BD9-81ED-4DB2-BD59-A6C34878D82A}">
-                    <a16:rowId xmlns:a16="http://schemas.microsoft.com/office/drawing/2014/main" val="2925382448"/>
-                  </a:ext>
-                </a:extLst>
-              </a:tr>
-            </a:tbl>
-          </a:graphicData>
-        </a:graphic>
-      </p:graphicFrame>
-      <p:cxnSp>
-        <p:nvCxnSpPr>
-          <p:cNvPr id="10" name="Conexão reta 9">
-            <a:extLst>
-              <a:ext uri="{FF2B5EF4-FFF2-40B4-BE49-F238E27FC236}">
-                <a16:creationId xmlns:a16="http://schemas.microsoft.com/office/drawing/2014/main" id="{6FE78C57-9C7E-4771-B203-78CE25AA647C}"/>
-              </a:ext>
-            </a:extLst>
-          </p:cNvPr>
-          <p:cNvCxnSpPr>
-            <a:cxnSpLocks/>
-          </p:cNvCxnSpPr>
+          <p:cNvPicPr>
+            <a:picLocks noChangeAspect="1"/>
+          </p:cNvPicPr>
           <p:nvPr/>
-        </p:nvCxnSpPr>
+        </p:nvPicPr>
+        <p:blipFill rotWithShape="1">
+          <a:blip r:embed="rId2"/>
+          <a:srcRect l="816" t="2242" r="1258" b="4748"/>
+          <a:stretch/>
+        </p:blipFill>
         <p:spPr>
           <a:xfrm>
-            <a:off x="707088" y="1128274"/>
-            <a:ext cx="1532529" cy="952317"/>
+            <a:off x="455296" y="1428169"/>
+            <a:ext cx="11358559" cy="4001661"/>
           </a:xfrm>
-          <a:prstGeom prst="line">
+          <a:prstGeom prst="rect">
             <a:avLst/>
           </a:prstGeom>
-          <a:ln>
-            <a:solidFill>
-              <a:schemeClr val="bg1"/>
-            </a:solidFill>
-          </a:ln>
         </p:spPr>
-        <p:style>
-          <a:lnRef idx="1">
-            <a:schemeClr val="accent1"/>
-          </a:lnRef>
-          <a:fillRef idx="0">
-            <a:schemeClr val="accent1"/>
-          </a:fillRef>
-          <a:effectRef idx="0">
-            <a:schemeClr val="accent1"/>
-          </a:effectRef>
-          <a:fontRef idx="minor">
-            <a:schemeClr val="tx1"/>
-          </a:fontRef>
-        </p:style>
-      </p:cxnSp>
+      </p:pic>
     </p:spTree>
     <p:extLst>
       <p:ext uri="{BB962C8B-B14F-4D97-AF65-F5344CB8AC3E}">
@@ -11210,7 +9808,7 @@
           <a:lstStyle/>
           <a:p>
             <a:r>
-              <a:rPr lang="pt-PT" dirty="0"/>
+              <a:rPr lang="pt-PT" b="1" u="sng" dirty="0"/>
               <a:t>Foram implementadas as seguintes funcionalidades para os aviões:</a:t>
             </a:r>
           </a:p>
@@ -11222,14 +9820,22 @@
             </a:r>
             <a:r>
               <a:rPr lang="pt-PT" dirty="0"/>
-              <a:t> através de um ficheiro de texto- Completa</a:t>
+              <a:t> através de um ficheiro de texto- </a:t>
+            </a:r>
+            <a:r>
+              <a:rPr lang="pt-PT" b="1" dirty="0"/>
+              <a:t>Completa</a:t>
             </a:r>
           </a:p>
           <a:p>
             <a:pPr lvl="1"/>
             <a:r>
               <a:rPr lang="pt-PT" dirty="0"/>
-              <a:t>Mostrar os aviões ordenados na consola - Completa</a:t>
+              <a:t>Mostrar os aviões ordenados na consola- </a:t>
+            </a:r>
+            <a:r>
+              <a:rPr lang="pt-PT" b="1" dirty="0"/>
+              <a:t>Completa</a:t>
             </a:r>
           </a:p>
           <a:p>
@@ -11244,26 +9850,38 @@
             </a:r>
             <a:r>
               <a:rPr lang="pt-PT" dirty="0"/>
-              <a:t> – Completa</a:t>
+              <a:t>- </a:t>
+            </a:r>
+            <a:r>
+              <a:rPr lang="pt-PT" b="1" dirty="0"/>
+              <a:t>Completa</a:t>
             </a:r>
           </a:p>
           <a:p>
             <a:pPr lvl="1"/>
             <a:r>
               <a:rPr lang="pt-PT" dirty="0"/>
-              <a:t> Remover aviões do vetor – Completa</a:t>
+              <a:t>Remover aviões do vetor- </a:t>
+            </a:r>
+            <a:r>
+              <a:rPr lang="pt-PT" b="1" dirty="0"/>
+              <a:t>Completa</a:t>
             </a:r>
           </a:p>
           <a:p>
             <a:pPr lvl="1"/>
             <a:r>
               <a:rPr lang="pt-PT" dirty="0"/>
-              <a:t>Atualizar ficheiro de texto- Completa</a:t>
-            </a:r>
-          </a:p>
-          <a:p>
-            <a:r>
-              <a:rPr lang="pt-PT" dirty="0"/>
+              <a:t>Atualizar ficheiro de texto- </a:t>
+            </a:r>
+            <a:r>
+              <a:rPr lang="pt-PT" b="1" dirty="0"/>
+              <a:t>Completa</a:t>
+            </a:r>
+          </a:p>
+          <a:p>
+            <a:r>
+              <a:rPr lang="pt-PT" b="1" u="sng" dirty="0"/>
               <a:t>Foram implementadas as seguintes funcionalidades para os voos:</a:t>
             </a:r>
           </a:p>
@@ -11275,35 +9893,55 @@
             </a:r>
             <a:r>
               <a:rPr lang="pt-PT" dirty="0"/>
-              <a:t> através de um ficheiro de texto- Completa</a:t>
+              <a:t> através de um ficheiro de texto- </a:t>
+            </a:r>
+            <a:r>
+              <a:rPr lang="pt-PT" b="1" dirty="0"/>
+              <a:t>Completa</a:t>
             </a:r>
           </a:p>
           <a:p>
             <a:pPr lvl="1"/>
             <a:r>
               <a:rPr lang="pt-PT" dirty="0"/>
-              <a:t>Mostrar os voos de todos os aviões na consola - Completa</a:t>
+              <a:t>Mostrar os voos de todos os aviões na consola- </a:t>
+            </a:r>
+            <a:r>
+              <a:rPr lang="pt-PT" b="1" dirty="0"/>
+              <a:t>Completa</a:t>
             </a:r>
           </a:p>
           <a:p>
             <a:pPr lvl="1"/>
             <a:r>
               <a:rPr lang="pt-PT" dirty="0"/>
-              <a:t>Adicionar voo com as características fornecidas pela companhia a um avião escolhido por esta – Parcial</a:t>
+              <a:t>Adicionar o voo com as características fornecidas pela companhia a um avião escolhido por esta- </a:t>
+            </a:r>
+            <a:r>
+              <a:rPr lang="pt-PT" b="1" dirty="0"/>
+              <a:t>Parcial</a:t>
             </a:r>
           </a:p>
           <a:p>
             <a:pPr lvl="1"/>
             <a:r>
               <a:rPr lang="pt-PT" dirty="0"/>
-              <a:t> Remover voo com id fornecido(percorre todos os voos de todos os aviões)- Parcial</a:t>
+              <a:t>Remover voo com o id fornecido (percorre todos os voos de todos os aviões)- </a:t>
+            </a:r>
+            <a:r>
+              <a:rPr lang="pt-PT" b="1" dirty="0"/>
+              <a:t>Parcial</a:t>
             </a:r>
           </a:p>
           <a:p>
             <a:pPr lvl="1"/>
             <a:r>
               <a:rPr lang="pt-PT" dirty="0"/>
-              <a:t>Atualizar ficheiro de texto- Parcial</a:t>
+              <a:t>Atualizar ficheiro de texto- </a:t>
+            </a:r>
+            <a:r>
+              <a:rPr lang="pt-PT" b="1" dirty="0"/>
+              <a:t>Parcial</a:t>
             </a:r>
           </a:p>
           <a:p>
@@ -11338,7 +9976,7 @@
             <a:pPr rtl="0"/>
             <a:fld id="{9E09E755-EDBC-4192-AC9E-FCC227FEE010}" type="datetime1">
               <a:rPr lang="pt-PT" smtClean="0"/>
-              <a:t>20/12/2021</a:t>
+              <a:t>21/12/2021</a:t>
             </a:fld>
             <a:endParaRPr lang="en-US" dirty="0"/>
           </a:p>
@@ -11426,7 +10064,7 @@
           <a:lstStyle/>
           <a:p>
             <a:r>
-              <a:rPr lang="pt-PT" dirty="0"/>
+              <a:rPr lang="pt-PT" b="1" u="sng" dirty="0"/>
               <a:t>Foram implementadas as seguintes funcionalidades para os serviços:</a:t>
             </a:r>
           </a:p>
@@ -11438,62 +10076,94 @@
             </a:r>
             <a:r>
               <a:rPr lang="pt-PT" dirty="0"/>
-              <a:t> através de um ficheiro de texto- Parcial</a:t>
+              <a:t> através de um ficheiro de texto- </a:t>
+            </a:r>
+            <a:r>
+              <a:rPr lang="pt-PT" b="1" dirty="0"/>
+              <a:t>Parcial</a:t>
             </a:r>
           </a:p>
           <a:p>
             <a:pPr lvl="1"/>
             <a:r>
               <a:rPr lang="pt-PT" dirty="0"/>
-              <a:t>Efetuar o primeiro serviço da fila do avião escolhido- Parcial</a:t>
+              <a:t>Efetuar o primeiro serviço da fila do avião escolhido- </a:t>
+            </a:r>
+            <a:r>
+              <a:rPr lang="pt-PT" b="1" dirty="0"/>
+              <a:t>Parcial</a:t>
             </a:r>
           </a:p>
           <a:p>
             <a:pPr lvl="1"/>
             <a:r>
               <a:rPr lang="pt-PT" dirty="0"/>
-              <a:t>Mostrar último serviço realizado – Completa</a:t>
+              <a:t>Mostrar último serviço realizado- </a:t>
+            </a:r>
+            <a:r>
+              <a:rPr lang="pt-PT" b="1" dirty="0"/>
+              <a:t>Completa</a:t>
             </a:r>
           </a:p>
           <a:p>
             <a:pPr lvl="1"/>
             <a:r>
               <a:rPr lang="pt-PT" dirty="0"/>
-              <a:t> Adiciona serviço no fim da fila do avião escolhido – Parcial</a:t>
+              <a:t>Adiciona serviço no fim da fila do avião escolhido- </a:t>
+            </a:r>
+            <a:r>
+              <a:rPr lang="pt-PT" b="1" dirty="0"/>
+              <a:t>Parcial</a:t>
             </a:r>
           </a:p>
           <a:p>
             <a:pPr lvl="1"/>
             <a:r>
               <a:rPr lang="pt-PT" dirty="0"/>
-              <a:t>Atualizar ficheiro de texto- Parcial</a:t>
-            </a:r>
-          </a:p>
-          <a:p>
+              <a:t>Atualizar ficheiro de texto- </a:t>
+            </a:r>
+            <a:r>
+              <a:rPr lang="pt-PT" b="1" dirty="0"/>
+              <a:t>Parcial</a:t>
+            </a:r>
+          </a:p>
+          <a:p>
+            <a:r>
+              <a:rPr lang="pt-PT" b="1" u="sng" dirty="0"/>
+              <a:t>Foram implementadas as seguintes funcionalidades para a bagagem:</a:t>
+            </a:r>
+          </a:p>
+          <a:p>
+            <a:pPr lvl="1"/>
             <a:r>
               <a:rPr lang="pt-PT" dirty="0"/>
-              <a:t>Foram implementadas as seguintes funcionalidades para a bagagem:</a:t>
+              <a:t>Adicionar bagagem ao tapete rolante (fila)</a:t>
+            </a:r>
+            <a:r>
+              <a:rPr lang="pt-PT" b="1" dirty="0"/>
+              <a:t>- Parcial</a:t>
             </a:r>
           </a:p>
           <a:p>
             <a:pPr lvl="1"/>
             <a:r>
               <a:rPr lang="pt-PT" dirty="0"/>
-              <a:t>Adicionar bagagem ao tapete rolante(fila) – Parcial</a:t>
+              <a:t>Remover bagagem do tapete rolante (deve ser seguida de adicionar ao carrinho)- </a:t>
+            </a:r>
+            <a:r>
+              <a:rPr lang="pt-PT" b="1" dirty="0"/>
+              <a:t>Parcial</a:t>
             </a:r>
           </a:p>
           <a:p>
             <a:pPr lvl="1"/>
             <a:r>
               <a:rPr lang="pt-PT" dirty="0"/>
-              <a:t>Remover bagagem do tapete rolante(deve ser seguida de adicionar ao carrinho) – Parcial</a:t>
-            </a:r>
-          </a:p>
-          <a:p>
-            <a:pPr lvl="1"/>
-            <a:r>
-              <a:rPr lang="pt-PT" dirty="0"/>
-              <a:t>Adicionar bagagem ao primeiro sítio disponível do carrinho-Parcial</a:t>
+              <a:t>Adicionar bagagem ao primeiro sítio disponível do carrinho- </a:t>
+            </a:r>
+            <a:r>
+              <a:rPr lang="pt-PT" b="1" dirty="0"/>
+              <a:t>Parcial</a:t>
             </a:r>
           </a:p>
           <a:p>
@@ -11508,7 +10178,11 @@
             </a:r>
             <a:r>
               <a:rPr lang="pt-PT" dirty="0"/>
-              <a:t> - Parcial</a:t>
+              <a:t>- </a:t>
+            </a:r>
+            <a:r>
+              <a:rPr lang="pt-PT" b="1" dirty="0"/>
+              <a:t>Parcial</a:t>
             </a:r>
           </a:p>
           <a:p>
@@ -11541,7 +10215,7 @@
             <a:pPr rtl="0"/>
             <a:fld id="{9E09E755-EDBC-4192-AC9E-FCC227FEE010}" type="datetime1">
               <a:rPr lang="pt-PT" smtClean="0"/>
-              <a:t>20/12/2021</a:t>
+              <a:t>21/12/2021</a:t>
             </a:fld>
             <a:endParaRPr lang="en-US" dirty="0"/>
           </a:p>
@@ -11626,7 +10300,84 @@
           <a:bodyPr/>
           <a:lstStyle/>
           <a:p>
-            <a:endParaRPr lang="pt-PT"/>
+            <a:r>
+              <a:rPr lang="pt-PT" b="1" u="sng" dirty="0"/>
+              <a:t>Foram implementadas as seguintes funcionalidades para os transportes:</a:t>
+            </a:r>
+          </a:p>
+          <a:p>
+            <a:pPr lvl="1"/>
+            <a:r>
+              <a:rPr lang="pt-PT" dirty="0" err="1"/>
+              <a:t>Create</a:t>
+            </a:r>
+            <a:r>
+              <a:rPr lang="pt-PT" dirty="0"/>
+              <a:t> através de um ficheiro de texto- </a:t>
+            </a:r>
+            <a:r>
+              <a:rPr lang="pt-PT" b="1" dirty="0"/>
+              <a:t>Completa</a:t>
+            </a:r>
+          </a:p>
+          <a:p>
+            <a:pPr lvl="1"/>
+            <a:r>
+              <a:rPr lang="pt-PT" dirty="0"/>
+              <a:t>Ler o ficheiro, consoante os parâmetros requeridos- </a:t>
+            </a:r>
+            <a:r>
+              <a:rPr lang="pt-PT" b="1" dirty="0"/>
+              <a:t>Completa</a:t>
+            </a:r>
+          </a:p>
+          <a:p>
+            <a:pPr lvl="1"/>
+            <a:r>
+              <a:rPr lang="pt-PT" dirty="0"/>
+              <a:t>Implementar operadores de modo a pesquisar por elementos na BST- </a:t>
+            </a:r>
+            <a:r>
+              <a:rPr lang="pt-PT" b="1" dirty="0"/>
+              <a:t>Completa</a:t>
+            </a:r>
+          </a:p>
+          <a:p>
+            <a:pPr lvl="1"/>
+            <a:r>
+              <a:rPr lang="pt-PT" dirty="0"/>
+              <a:t>Implementar operadores de modo a inserir elementos na BST- </a:t>
+            </a:r>
+            <a:r>
+              <a:rPr lang="pt-PT" b="1" dirty="0"/>
+              <a:t>Parcial</a:t>
+            </a:r>
+          </a:p>
+          <a:p>
+            <a:pPr lvl="1"/>
+            <a:r>
+              <a:rPr lang="pt-PT" dirty="0"/>
+              <a:t>Criação de uma BST para cada aeroporto- </a:t>
+            </a:r>
+            <a:r>
+              <a:rPr lang="pt-PT" b="1" dirty="0"/>
+              <a:t>Parcial</a:t>
+            </a:r>
+          </a:p>
+          <a:p>
+            <a:pPr lvl="1"/>
+            <a:r>
+              <a:rPr lang="pt-PT" dirty="0"/>
+              <a:t>Mostrar os transportes ordenados na consola- </a:t>
+            </a:r>
+            <a:r>
+              <a:rPr lang="pt-PT" b="1" dirty="0"/>
+              <a:t>Completa</a:t>
+            </a:r>
+          </a:p>
+          <a:p>
+            <a:pPr lvl="1"/>
+            <a:endParaRPr lang="pt-PT" dirty="0"/>
           </a:p>
         </p:txBody>
       </p:sp>
@@ -11654,7 +10405,7 @@
             <a:pPr rtl="0"/>
             <a:fld id="{9E09E755-EDBC-4192-AC9E-FCC227FEE010}" type="datetime1">
               <a:rPr lang="pt-PT" smtClean="0"/>
-              <a:t>20/12/2021</a:t>
+              <a:t>21/12/2021</a:t>
             </a:fld>
             <a:endParaRPr lang="en-US" dirty="0"/>
           </a:p>

</xml_diff>